<commit_message>
update roadmap deck, hide slides not needed (ops focus)
</commit_message>
<xml_diff>
--- a/presentations/PCF_Roadmap_(current).pptx
+++ b/presentations/PCF_Roadmap_(current).pptx
@@ -14941,7 +14941,7 @@
 </file>
 
 <file path=ppt/slides/slide13.xml><?xml version="1.0" encoding="utf-8"?>
-<p:sld xmlns:a="http://schemas.openxmlformats.org/drawingml/2006/main" xmlns:r="http://schemas.openxmlformats.org/officeDocument/2006/relationships" xmlns:p="http://schemas.openxmlformats.org/presentationml/2006/main">
+<p:sld xmlns:a="http://schemas.openxmlformats.org/drawingml/2006/main" xmlns:r="http://schemas.openxmlformats.org/officeDocument/2006/relationships" xmlns:p="http://schemas.openxmlformats.org/presentationml/2006/main" show="0">
   <p:cSld>
     <p:spTree>
       <p:nvGrpSpPr>
@@ -15527,7 +15527,7 @@
 </file>
 
 <file path=ppt/slides/slide15.xml><?xml version="1.0" encoding="utf-8"?>
-<p:sld xmlns:a="http://schemas.openxmlformats.org/drawingml/2006/main" xmlns:r="http://schemas.openxmlformats.org/officeDocument/2006/relationships" xmlns:p="http://schemas.openxmlformats.org/presentationml/2006/main">
+<p:sld xmlns:a="http://schemas.openxmlformats.org/drawingml/2006/main" xmlns:r="http://schemas.openxmlformats.org/officeDocument/2006/relationships" xmlns:p="http://schemas.openxmlformats.org/presentationml/2006/main" show="0">
   <p:cSld>
     <p:spTree>
       <p:nvGrpSpPr>
@@ -15770,7 +15770,7 @@
 </file>
 
 <file path=ppt/slides/slide16.xml><?xml version="1.0" encoding="utf-8"?>
-<p:sld xmlns:a="http://schemas.openxmlformats.org/drawingml/2006/main" xmlns:r="http://schemas.openxmlformats.org/officeDocument/2006/relationships" xmlns:p="http://schemas.openxmlformats.org/presentationml/2006/main">
+<p:sld xmlns:a="http://schemas.openxmlformats.org/drawingml/2006/main" xmlns:r="http://schemas.openxmlformats.org/officeDocument/2006/relationships" xmlns:p="http://schemas.openxmlformats.org/presentationml/2006/main" show="0">
   <p:cSld>
     <p:spTree>
       <p:nvGrpSpPr>
@@ -16119,7 +16119,7 @@
 </file>
 
 <file path=ppt/slides/slide17.xml><?xml version="1.0" encoding="utf-8"?>
-<p:sld xmlns:a="http://schemas.openxmlformats.org/drawingml/2006/main" xmlns:r="http://schemas.openxmlformats.org/officeDocument/2006/relationships" xmlns:p="http://schemas.openxmlformats.org/presentationml/2006/main">
+<p:sld xmlns:a="http://schemas.openxmlformats.org/drawingml/2006/main" xmlns:r="http://schemas.openxmlformats.org/officeDocument/2006/relationships" xmlns:p="http://schemas.openxmlformats.org/presentationml/2006/main" show="0">
   <p:cSld>
     <p:spTree>
       <p:nvGrpSpPr>
@@ -16532,6 +16532,14 @@
   <p:clrMapOvr>
     <a:masterClrMapping/>
   </p:clrMapOvr>
+  <mc:AlternateContent xmlns:mc="http://schemas.openxmlformats.org/markup-compatibility/2006">
+    <mc:Choice xmlns:p14="http://schemas.microsoft.com/office/powerpoint/2010/main" Requires="p14">
+      <p:transition spd="slow" p14:dur="2000"/>
+    </mc:Choice>
+    <mc:Fallback>
+      <p:transition xmlns:p14="http://schemas.microsoft.com/office/powerpoint/2010/main" spd="slow"/>
+    </mc:Fallback>
+  </mc:AlternateContent>
 </p:sld>
 </file>
 
@@ -23721,7 +23729,7 @@
 </file>
 
 <file path=ppt/slides/slide39.xml><?xml version="1.0" encoding="utf-8"?>
-<p:sld xmlns:a="http://schemas.openxmlformats.org/drawingml/2006/main" xmlns:r="http://schemas.openxmlformats.org/officeDocument/2006/relationships" xmlns:p="http://schemas.openxmlformats.org/presentationml/2006/main">
+<p:sld xmlns:a="http://schemas.openxmlformats.org/drawingml/2006/main" xmlns:r="http://schemas.openxmlformats.org/officeDocument/2006/relationships" xmlns:p="http://schemas.openxmlformats.org/presentationml/2006/main" show="0">
   <p:cSld>
     <p:spTree>
       <p:nvGrpSpPr>
@@ -23797,6 +23805,14 @@
   <p:clrMapOvr>
     <a:masterClrMapping/>
   </p:clrMapOvr>
+  <mc:AlternateContent xmlns:mc="http://schemas.openxmlformats.org/markup-compatibility/2006">
+    <mc:Choice xmlns:p14="http://schemas.microsoft.com/office/powerpoint/2010/main" Requires="p14">
+      <p:transition spd="slow" p14:dur="2000"/>
+    </mc:Choice>
+    <mc:Fallback>
+      <p:transition xmlns:p14="http://schemas.microsoft.com/office/powerpoint/2010/main" spd="slow"/>
+    </mc:Fallback>
+  </mc:AlternateContent>
 </p:sld>
 </file>
 
@@ -24271,7 +24287,7 @@
 </file>
 
 <file path=ppt/slides/slide40.xml><?xml version="1.0" encoding="utf-8"?>
-<p:sld xmlns:a="http://schemas.openxmlformats.org/drawingml/2006/main" xmlns:r="http://schemas.openxmlformats.org/officeDocument/2006/relationships" xmlns:p="http://schemas.openxmlformats.org/presentationml/2006/main">
+<p:sld xmlns:a="http://schemas.openxmlformats.org/drawingml/2006/main" xmlns:r="http://schemas.openxmlformats.org/officeDocument/2006/relationships" xmlns:p="http://schemas.openxmlformats.org/presentationml/2006/main" show="0">
   <p:cSld>
     <p:spTree>
       <p:nvGrpSpPr>
@@ -24601,7 +24617,7 @@
 </file>
 
 <file path=ppt/slides/slide41.xml><?xml version="1.0" encoding="utf-8"?>
-<p:sld xmlns:a="http://schemas.openxmlformats.org/drawingml/2006/main" xmlns:r="http://schemas.openxmlformats.org/officeDocument/2006/relationships" xmlns:p="http://schemas.openxmlformats.org/presentationml/2006/main">
+<p:sld xmlns:a="http://schemas.openxmlformats.org/drawingml/2006/main" xmlns:r="http://schemas.openxmlformats.org/officeDocument/2006/relationships" xmlns:p="http://schemas.openxmlformats.org/presentationml/2006/main" show="0">
   <p:cSld>
     <p:spTree>
       <p:nvGrpSpPr>
@@ -24907,7 +24923,7 @@
 </file>
 
 <file path=ppt/slides/slide42.xml><?xml version="1.0" encoding="utf-8"?>
-<p:sld xmlns:a="http://schemas.openxmlformats.org/drawingml/2006/main" xmlns:r="http://schemas.openxmlformats.org/officeDocument/2006/relationships" xmlns:p="http://schemas.openxmlformats.org/presentationml/2006/main">
+<p:sld xmlns:a="http://schemas.openxmlformats.org/drawingml/2006/main" xmlns:r="http://schemas.openxmlformats.org/officeDocument/2006/relationships" xmlns:p="http://schemas.openxmlformats.org/presentationml/2006/main" show="0">
   <p:cSld>
     <p:spTree>
       <p:nvGrpSpPr>
@@ -25119,7 +25135,7 @@
 </file>
 
 <file path=ppt/slides/slide43.xml><?xml version="1.0" encoding="utf-8"?>
-<p:sld xmlns:a="http://schemas.openxmlformats.org/drawingml/2006/main" xmlns:r="http://schemas.openxmlformats.org/officeDocument/2006/relationships" xmlns:p="http://schemas.openxmlformats.org/presentationml/2006/main">
+<p:sld xmlns:a="http://schemas.openxmlformats.org/drawingml/2006/main" xmlns:r="http://schemas.openxmlformats.org/officeDocument/2006/relationships" xmlns:p="http://schemas.openxmlformats.org/presentationml/2006/main" show="0">
   <p:cSld>
     <p:spTree>
       <p:nvGrpSpPr>
@@ -25228,7 +25244,7 @@
 </file>
 
 <file path=ppt/slides/slide44.xml><?xml version="1.0" encoding="utf-8"?>
-<p:sld xmlns:a="http://schemas.openxmlformats.org/drawingml/2006/main" xmlns:r="http://schemas.openxmlformats.org/officeDocument/2006/relationships" xmlns:p="http://schemas.openxmlformats.org/presentationml/2006/main">
+<p:sld xmlns:a="http://schemas.openxmlformats.org/drawingml/2006/main" xmlns:r="http://schemas.openxmlformats.org/officeDocument/2006/relationships" xmlns:p="http://schemas.openxmlformats.org/presentationml/2006/main" show="0">
   <p:cSld>
     <p:spTree>
       <p:nvGrpSpPr>
@@ -25337,7 +25353,7 @@
 </file>
 
 <file path=ppt/slides/slide45.xml><?xml version="1.0" encoding="utf-8"?>
-<p:sld xmlns:a="http://schemas.openxmlformats.org/drawingml/2006/main" xmlns:r="http://schemas.openxmlformats.org/officeDocument/2006/relationships" xmlns:p="http://schemas.openxmlformats.org/presentationml/2006/main">
+<p:sld xmlns:a="http://schemas.openxmlformats.org/drawingml/2006/main" xmlns:r="http://schemas.openxmlformats.org/officeDocument/2006/relationships" xmlns:p="http://schemas.openxmlformats.org/presentationml/2006/main" show="0">
   <p:cSld>
     <p:spTree>
       <p:nvGrpSpPr>
@@ -25529,7 +25545,7 @@
 </file>
 
 <file path=ppt/slides/slide46.xml><?xml version="1.0" encoding="utf-8"?>
-<p:sld xmlns:a="http://schemas.openxmlformats.org/drawingml/2006/main" xmlns:r="http://schemas.openxmlformats.org/officeDocument/2006/relationships" xmlns:p="http://schemas.openxmlformats.org/presentationml/2006/main">
+<p:sld xmlns:a="http://schemas.openxmlformats.org/drawingml/2006/main" xmlns:r="http://schemas.openxmlformats.org/officeDocument/2006/relationships" xmlns:p="http://schemas.openxmlformats.org/presentationml/2006/main" show="0">
   <p:cSld>
     <p:spTree>
       <p:nvGrpSpPr>
@@ -25909,7 +25925,7 @@
 </file>
 
 <file path=ppt/slides/slide47.xml><?xml version="1.0" encoding="utf-8"?>
-<p:sld xmlns:a="http://schemas.openxmlformats.org/drawingml/2006/main" xmlns:r="http://schemas.openxmlformats.org/officeDocument/2006/relationships" xmlns:p="http://schemas.openxmlformats.org/presentationml/2006/main">
+<p:sld xmlns:a="http://schemas.openxmlformats.org/drawingml/2006/main" xmlns:r="http://schemas.openxmlformats.org/officeDocument/2006/relationships" xmlns:p="http://schemas.openxmlformats.org/presentationml/2006/main" show="0">
   <p:cSld>
     <p:spTree>
       <p:nvGrpSpPr>
@@ -26115,7 +26131,7 @@
 </file>
 
 <file path=ppt/slides/slide48.xml><?xml version="1.0" encoding="utf-8"?>
-<p:sld xmlns:a="http://schemas.openxmlformats.org/drawingml/2006/main" xmlns:r="http://schemas.openxmlformats.org/officeDocument/2006/relationships" xmlns:p="http://schemas.openxmlformats.org/presentationml/2006/main">
+<p:sld xmlns:a="http://schemas.openxmlformats.org/drawingml/2006/main" xmlns:r="http://schemas.openxmlformats.org/officeDocument/2006/relationships" xmlns:p="http://schemas.openxmlformats.org/presentationml/2006/main" show="0">
   <p:cSld>
     <p:spTree>
       <p:nvGrpSpPr>
@@ -26401,7 +26417,7 @@
 </file>
 
 <file path=ppt/slides/slide49.xml><?xml version="1.0" encoding="utf-8"?>
-<p:sld xmlns:a="http://schemas.openxmlformats.org/drawingml/2006/main" xmlns:r="http://schemas.openxmlformats.org/officeDocument/2006/relationships" xmlns:p="http://schemas.openxmlformats.org/presentationml/2006/main">
+<p:sld xmlns:a="http://schemas.openxmlformats.org/drawingml/2006/main" xmlns:r="http://schemas.openxmlformats.org/officeDocument/2006/relationships" xmlns:p="http://schemas.openxmlformats.org/presentationml/2006/main" show="0">
   <p:cSld>
     <p:spTree>
       <p:nvGrpSpPr>
@@ -27157,7 +27173,7 @@
 </file>
 
 <file path=ppt/slides/slide50.xml><?xml version="1.0" encoding="utf-8"?>
-<p:sld xmlns:a="http://schemas.openxmlformats.org/drawingml/2006/main" xmlns:r="http://schemas.openxmlformats.org/officeDocument/2006/relationships" xmlns:p="http://schemas.openxmlformats.org/presentationml/2006/main">
+<p:sld xmlns:a="http://schemas.openxmlformats.org/drawingml/2006/main" xmlns:r="http://schemas.openxmlformats.org/officeDocument/2006/relationships" xmlns:p="http://schemas.openxmlformats.org/presentationml/2006/main" show="0">
   <p:cSld>
     <p:spTree>
       <p:nvGrpSpPr>
@@ -27514,7 +27530,7 @@
 </file>
 
 <file path=ppt/slides/slide51.xml><?xml version="1.0" encoding="utf-8"?>
-<p:sld xmlns:a="http://schemas.openxmlformats.org/drawingml/2006/main" xmlns:r="http://schemas.openxmlformats.org/officeDocument/2006/relationships" xmlns:p="http://schemas.openxmlformats.org/presentationml/2006/main">
+<p:sld xmlns:a="http://schemas.openxmlformats.org/drawingml/2006/main" xmlns:r="http://schemas.openxmlformats.org/officeDocument/2006/relationships" xmlns:p="http://schemas.openxmlformats.org/presentationml/2006/main" show="0">
   <p:cSld>
     <p:spTree>
       <p:nvGrpSpPr>
@@ -27590,11 +27606,19 @@
   <p:clrMapOvr>
     <a:masterClrMapping/>
   </p:clrMapOvr>
+  <mc:AlternateContent xmlns:mc="http://schemas.openxmlformats.org/markup-compatibility/2006">
+    <mc:Choice xmlns:p14="http://schemas.microsoft.com/office/powerpoint/2010/main" Requires="p14">
+      <p:transition spd="slow" p14:dur="2000"/>
+    </mc:Choice>
+    <mc:Fallback>
+      <p:transition xmlns:p14="http://schemas.microsoft.com/office/powerpoint/2010/main" spd="slow"/>
+    </mc:Fallback>
+  </mc:AlternateContent>
 </p:sld>
 </file>
 
 <file path=ppt/slides/slide52.xml><?xml version="1.0" encoding="utf-8"?>
-<p:sld xmlns:a="http://schemas.openxmlformats.org/drawingml/2006/main" xmlns:r="http://schemas.openxmlformats.org/officeDocument/2006/relationships" xmlns:p="http://schemas.openxmlformats.org/presentationml/2006/main">
+<p:sld xmlns:a="http://schemas.openxmlformats.org/drawingml/2006/main" xmlns:r="http://schemas.openxmlformats.org/officeDocument/2006/relationships" xmlns:p="http://schemas.openxmlformats.org/presentationml/2006/main" show="0">
   <p:cSld>
     <p:spTree>
       <p:nvGrpSpPr>
@@ -27981,7 +28005,7 @@
 </file>
 
 <file path=ppt/slides/slide53.xml><?xml version="1.0" encoding="utf-8"?>
-<p:sld xmlns:a="http://schemas.openxmlformats.org/drawingml/2006/main" xmlns:r="http://schemas.openxmlformats.org/officeDocument/2006/relationships" xmlns:p="http://schemas.openxmlformats.org/presentationml/2006/main">
+<p:sld xmlns:a="http://schemas.openxmlformats.org/drawingml/2006/main" xmlns:r="http://schemas.openxmlformats.org/officeDocument/2006/relationships" xmlns:p="http://schemas.openxmlformats.org/presentationml/2006/main" show="0">
   <p:cSld>
     <p:spTree>
       <p:nvGrpSpPr>
@@ -28302,7 +28326,7 @@
 </file>
 
 <file path=ppt/slides/slide54.xml><?xml version="1.0" encoding="utf-8"?>
-<p:sld xmlns:a="http://schemas.openxmlformats.org/drawingml/2006/main" xmlns:r="http://schemas.openxmlformats.org/officeDocument/2006/relationships" xmlns:p="http://schemas.openxmlformats.org/presentationml/2006/main">
+<p:sld xmlns:a="http://schemas.openxmlformats.org/drawingml/2006/main" xmlns:r="http://schemas.openxmlformats.org/officeDocument/2006/relationships" xmlns:p="http://schemas.openxmlformats.org/presentationml/2006/main" show="0">
   <p:cSld>
     <p:spTree>
       <p:nvGrpSpPr>
@@ -28600,7 +28624,7 @@
 </file>
 
 <file path=ppt/slides/slide55.xml><?xml version="1.0" encoding="utf-8"?>
-<p:sld xmlns:a="http://schemas.openxmlformats.org/drawingml/2006/main" xmlns:r="http://schemas.openxmlformats.org/officeDocument/2006/relationships" xmlns:p="http://schemas.openxmlformats.org/presentationml/2006/main">
+<p:sld xmlns:a="http://schemas.openxmlformats.org/drawingml/2006/main" xmlns:r="http://schemas.openxmlformats.org/officeDocument/2006/relationships" xmlns:p="http://schemas.openxmlformats.org/presentationml/2006/main" show="0">
   <p:cSld>
     <p:spTree>
       <p:nvGrpSpPr>
@@ -28712,7 +28736,7 @@
 </file>
 
 <file path=ppt/slides/slide56.xml><?xml version="1.0" encoding="utf-8"?>
-<p:sld xmlns:a="http://schemas.openxmlformats.org/drawingml/2006/main" xmlns:r="http://schemas.openxmlformats.org/officeDocument/2006/relationships" xmlns:p="http://schemas.openxmlformats.org/presentationml/2006/main">
+<p:sld xmlns:a="http://schemas.openxmlformats.org/drawingml/2006/main" xmlns:r="http://schemas.openxmlformats.org/officeDocument/2006/relationships" xmlns:p="http://schemas.openxmlformats.org/presentationml/2006/main" show="0">
   <p:cSld>
     <p:spTree>
       <p:nvGrpSpPr>
@@ -30054,7 +30078,7 @@
 </file>
 
 <file path=ppt/slides/slide8.xml><?xml version="1.0" encoding="utf-8"?>
-<p:sld xmlns:a="http://schemas.openxmlformats.org/drawingml/2006/main" xmlns:r="http://schemas.openxmlformats.org/officeDocument/2006/relationships" xmlns:p="http://schemas.openxmlformats.org/presentationml/2006/main">
+<p:sld xmlns:a="http://schemas.openxmlformats.org/drawingml/2006/main" xmlns:r="http://schemas.openxmlformats.org/officeDocument/2006/relationships" xmlns:p="http://schemas.openxmlformats.org/presentationml/2006/main" show="0">
   <p:cSld>
     <p:spTree>
       <p:nvGrpSpPr>

</xml_diff>